<commit_message>
FrontController.fx refactored and split into several new components (a separate command for each twitter function that is invoked from the application)
</commit_message>
<xml_diff>
--- a/trunk/tweetboxlogo.pptx
+++ b/trunk/tweetboxlogo.pptx
@@ -288,7 +288,8 @@
           <a:p>
             <a:fld id="{BA43E912-F2B5-4B81-AAD6-8F08D81FD78D}" type="datetimeFigureOut">
               <a:rPr lang="nl-NL" smtClean="0"/>
-              <a:t>27-11-2008</a:t>
+              <a:pPr/>
+              <a:t>28-1-2009</a:t>
             </a:fld>
             <a:endParaRPr lang="nl-NL"/>
           </a:p>
@@ -330,6 +331,7 @@
           <a:p>
             <a:fld id="{43C9BD6B-3B7D-4744-BD55-52F45FB07FEF}" type="slidenum">
               <a:rPr lang="nl-NL" smtClean="0"/>
+              <a:pPr/>
               <a:t>‹#›</a:t>
             </a:fld>
             <a:endParaRPr lang="nl-NL"/>
@@ -453,7 +455,8 @@
           <a:p>
             <a:fld id="{BA43E912-F2B5-4B81-AAD6-8F08D81FD78D}" type="datetimeFigureOut">
               <a:rPr lang="nl-NL" smtClean="0"/>
-              <a:t>27-11-2008</a:t>
+              <a:pPr/>
+              <a:t>28-1-2009</a:t>
             </a:fld>
             <a:endParaRPr lang="nl-NL"/>
           </a:p>
@@ -495,6 +498,7 @@
           <a:p>
             <a:fld id="{43C9BD6B-3B7D-4744-BD55-52F45FB07FEF}" type="slidenum">
               <a:rPr lang="nl-NL" smtClean="0"/>
+              <a:pPr/>
               <a:t>‹#›</a:t>
             </a:fld>
             <a:endParaRPr lang="nl-NL"/>
@@ -628,7 +632,8 @@
           <a:p>
             <a:fld id="{BA43E912-F2B5-4B81-AAD6-8F08D81FD78D}" type="datetimeFigureOut">
               <a:rPr lang="nl-NL" smtClean="0"/>
-              <a:t>27-11-2008</a:t>
+              <a:pPr/>
+              <a:t>28-1-2009</a:t>
             </a:fld>
             <a:endParaRPr lang="nl-NL"/>
           </a:p>
@@ -670,6 +675,7 @@
           <a:p>
             <a:fld id="{43C9BD6B-3B7D-4744-BD55-52F45FB07FEF}" type="slidenum">
               <a:rPr lang="nl-NL" smtClean="0"/>
+              <a:pPr/>
               <a:t>‹#›</a:t>
             </a:fld>
             <a:endParaRPr lang="nl-NL"/>
@@ -793,7 +799,8 @@
           <a:p>
             <a:fld id="{BA43E912-F2B5-4B81-AAD6-8F08D81FD78D}" type="datetimeFigureOut">
               <a:rPr lang="nl-NL" smtClean="0"/>
-              <a:t>27-11-2008</a:t>
+              <a:pPr/>
+              <a:t>28-1-2009</a:t>
             </a:fld>
             <a:endParaRPr lang="nl-NL"/>
           </a:p>
@@ -835,6 +842,7 @@
           <a:p>
             <a:fld id="{43C9BD6B-3B7D-4744-BD55-52F45FB07FEF}" type="slidenum">
               <a:rPr lang="nl-NL" smtClean="0"/>
+              <a:pPr/>
               <a:t>‹#›</a:t>
             </a:fld>
             <a:endParaRPr lang="nl-NL"/>
@@ -1034,7 +1042,8 @@
           <a:p>
             <a:fld id="{BA43E912-F2B5-4B81-AAD6-8F08D81FD78D}" type="datetimeFigureOut">
               <a:rPr lang="nl-NL" smtClean="0"/>
-              <a:t>27-11-2008</a:t>
+              <a:pPr/>
+              <a:t>28-1-2009</a:t>
             </a:fld>
             <a:endParaRPr lang="nl-NL"/>
           </a:p>
@@ -1076,6 +1085,7 @@
           <a:p>
             <a:fld id="{43C9BD6B-3B7D-4744-BD55-52F45FB07FEF}" type="slidenum">
               <a:rPr lang="nl-NL" smtClean="0"/>
+              <a:pPr/>
               <a:t>‹#›</a:t>
             </a:fld>
             <a:endParaRPr lang="nl-NL"/>
@@ -1317,7 +1327,8 @@
           <a:p>
             <a:fld id="{BA43E912-F2B5-4B81-AAD6-8F08D81FD78D}" type="datetimeFigureOut">
               <a:rPr lang="nl-NL" smtClean="0"/>
-              <a:t>27-11-2008</a:t>
+              <a:pPr/>
+              <a:t>28-1-2009</a:t>
             </a:fld>
             <a:endParaRPr lang="nl-NL"/>
           </a:p>
@@ -1359,6 +1370,7 @@
           <a:p>
             <a:fld id="{43C9BD6B-3B7D-4744-BD55-52F45FB07FEF}" type="slidenum">
               <a:rPr lang="nl-NL" smtClean="0"/>
+              <a:pPr/>
               <a:t>‹#›</a:t>
             </a:fld>
             <a:endParaRPr lang="nl-NL"/>
@@ -1734,7 +1746,8 @@
           <a:p>
             <a:fld id="{BA43E912-F2B5-4B81-AAD6-8F08D81FD78D}" type="datetimeFigureOut">
               <a:rPr lang="nl-NL" smtClean="0"/>
-              <a:t>27-11-2008</a:t>
+              <a:pPr/>
+              <a:t>28-1-2009</a:t>
             </a:fld>
             <a:endParaRPr lang="nl-NL"/>
           </a:p>
@@ -1776,6 +1789,7 @@
           <a:p>
             <a:fld id="{43C9BD6B-3B7D-4744-BD55-52F45FB07FEF}" type="slidenum">
               <a:rPr lang="nl-NL" smtClean="0"/>
+              <a:pPr/>
               <a:t>‹#›</a:t>
             </a:fld>
             <a:endParaRPr lang="nl-NL"/>
@@ -1847,7 +1861,8 @@
           <a:p>
             <a:fld id="{BA43E912-F2B5-4B81-AAD6-8F08D81FD78D}" type="datetimeFigureOut">
               <a:rPr lang="nl-NL" smtClean="0"/>
-              <a:t>27-11-2008</a:t>
+              <a:pPr/>
+              <a:t>28-1-2009</a:t>
             </a:fld>
             <a:endParaRPr lang="nl-NL"/>
           </a:p>
@@ -1889,6 +1904,7 @@
           <a:p>
             <a:fld id="{43C9BD6B-3B7D-4744-BD55-52F45FB07FEF}" type="slidenum">
               <a:rPr lang="nl-NL" smtClean="0"/>
+              <a:pPr/>
               <a:t>‹#›</a:t>
             </a:fld>
             <a:endParaRPr lang="nl-NL"/>
@@ -1937,7 +1953,8 @@
           <a:p>
             <a:fld id="{BA43E912-F2B5-4B81-AAD6-8F08D81FD78D}" type="datetimeFigureOut">
               <a:rPr lang="nl-NL" smtClean="0"/>
-              <a:t>27-11-2008</a:t>
+              <a:pPr/>
+              <a:t>28-1-2009</a:t>
             </a:fld>
             <a:endParaRPr lang="nl-NL"/>
           </a:p>
@@ -1979,6 +1996,7 @@
           <a:p>
             <a:fld id="{43C9BD6B-3B7D-4744-BD55-52F45FB07FEF}" type="slidenum">
               <a:rPr lang="nl-NL" smtClean="0"/>
+              <a:pPr/>
               <a:t>‹#›</a:t>
             </a:fld>
             <a:endParaRPr lang="nl-NL"/>
@@ -2209,7 +2227,8 @@
           <a:p>
             <a:fld id="{BA43E912-F2B5-4B81-AAD6-8F08D81FD78D}" type="datetimeFigureOut">
               <a:rPr lang="nl-NL" smtClean="0"/>
-              <a:t>27-11-2008</a:t>
+              <a:pPr/>
+              <a:t>28-1-2009</a:t>
             </a:fld>
             <a:endParaRPr lang="nl-NL"/>
           </a:p>
@@ -2251,6 +2270,7 @@
           <a:p>
             <a:fld id="{43C9BD6B-3B7D-4744-BD55-52F45FB07FEF}" type="slidenum">
               <a:rPr lang="nl-NL" smtClean="0"/>
+              <a:pPr/>
               <a:t>‹#›</a:t>
             </a:fld>
             <a:endParaRPr lang="nl-NL"/>
@@ -2457,7 +2477,8 @@
           <a:p>
             <a:fld id="{BA43E912-F2B5-4B81-AAD6-8F08D81FD78D}" type="datetimeFigureOut">
               <a:rPr lang="nl-NL" smtClean="0"/>
-              <a:t>27-11-2008</a:t>
+              <a:pPr/>
+              <a:t>28-1-2009</a:t>
             </a:fld>
             <a:endParaRPr lang="nl-NL"/>
           </a:p>
@@ -2499,6 +2520,7 @@
           <a:p>
             <a:fld id="{43C9BD6B-3B7D-4744-BD55-52F45FB07FEF}" type="slidenum">
               <a:rPr lang="nl-NL" smtClean="0"/>
+              <a:pPr/>
               <a:t>‹#›</a:t>
             </a:fld>
             <a:endParaRPr lang="nl-NL"/>
@@ -2665,7 +2687,8 @@
           <a:p>
             <a:fld id="{BA43E912-F2B5-4B81-AAD6-8F08D81FD78D}" type="datetimeFigureOut">
               <a:rPr lang="nl-NL" smtClean="0"/>
-              <a:t>27-11-2008</a:t>
+              <a:pPr/>
+              <a:t>28-1-2009</a:t>
             </a:fld>
             <a:endParaRPr lang="nl-NL"/>
           </a:p>
@@ -2743,6 +2766,7 @@
           <a:p>
             <a:fld id="{43C9BD6B-3B7D-4744-BD55-52F45FB07FEF}" type="slidenum">
               <a:rPr lang="nl-NL" smtClean="0"/>
+              <a:pPr/>
               <a:t>‹#›</a:t>
             </a:fld>
             <a:endParaRPr lang="nl-NL"/>
@@ -3021,6 +3045,14 @@
 <file path=ppt/slides/slide1.xml><?xml version="1.0" encoding="utf-8"?>
 <p:sld xmlns:a="http://schemas.openxmlformats.org/drawingml/2006/main" xmlns:r="http://schemas.openxmlformats.org/officeDocument/2006/relationships" xmlns:p="http://schemas.openxmlformats.org/presentationml/2006/main">
   <p:cSld>
+    <p:bg>
+      <p:bgPr>
+        <a:solidFill>
+          <a:schemeClr val="bg1"/>
+        </a:solidFill>
+        <a:effectLst/>
+      </p:bgPr>
+    </p:bg>
     <p:spTree>
       <p:nvGrpSpPr>
         <p:cNvPr id="1" name=""/>
@@ -3035,20 +3067,116 @@
           <a:chExt cx="0" cy="0"/>
         </a:xfrm>
       </p:grpSpPr>
+      <p:sp>
+        <p:nvSpPr>
+          <p:cNvPr id="10" name="Rectangle 9"/>
+          <p:cNvSpPr/>
+          <p:nvPr/>
+        </p:nvSpPr>
+        <p:spPr>
+          <a:xfrm>
+            <a:off x="1588169" y="2213811"/>
+            <a:ext cx="3715351" cy="1838425"/>
+          </a:xfrm>
+          <a:prstGeom prst="rect">
+            <a:avLst/>
+          </a:prstGeom>
+          <a:solidFill>
+            <a:srgbClr val="00B0F0"/>
+          </a:solidFill>
+          <a:ln w="19050">
+            <a:solidFill>
+              <a:srgbClr val="D71F3A"/>
+            </a:solidFill>
+          </a:ln>
+        </p:spPr>
+        <p:style>
+          <a:lnRef idx="2">
+            <a:schemeClr val="accent1">
+              <a:shade val="50000"/>
+            </a:schemeClr>
+          </a:lnRef>
+          <a:fillRef idx="1">
+            <a:schemeClr val="accent1"/>
+          </a:fillRef>
+          <a:effectRef idx="0">
+            <a:schemeClr val="accent1"/>
+          </a:effectRef>
+          <a:fontRef idx="minor">
+            <a:schemeClr val="lt1"/>
+          </a:fontRef>
+        </p:style>
+        <p:txBody>
+          <a:bodyPr rtlCol="0" anchor="ctr"/>
+          <a:lstStyle/>
+          <a:p>
+            <a:pPr algn="ctr"/>
+            <a:endParaRPr lang="nl-NL"/>
+          </a:p>
+        </p:txBody>
+      </p:sp>
       <p:grpSp>
         <p:nvGrpSpPr>
-          <p:cNvPr id="9" name="Group 8"/>
+          <p:cNvPr id="14" name="Group 13"/>
           <p:cNvGrpSpPr/>
           <p:nvPr/>
         </p:nvGrpSpPr>
         <p:grpSpPr>
           <a:xfrm>
-            <a:off x="3622091" y="3666478"/>
-            <a:ext cx="257452" cy="248576"/>
-            <a:chOff x="3622090" y="2415978"/>
-            <a:chExt cx="1535331" cy="1499075"/>
+            <a:off x="4238200" y="2841039"/>
+            <a:ext cx="961917" cy="921598"/>
+            <a:chOff x="4167180" y="4998313"/>
+            <a:chExt cx="961917" cy="921598"/>
           </a:xfrm>
         </p:grpSpPr>
+        <p:sp>
+          <p:nvSpPr>
+            <p:cNvPr id="7" name="Cube 6"/>
+            <p:cNvSpPr/>
+            <p:nvPr/>
+          </p:nvSpPr>
+          <p:spPr>
+            <a:xfrm rot="382530">
+              <a:off x="4167180" y="5128531"/>
+              <a:ext cx="807006" cy="791380"/>
+            </a:xfrm>
+            <a:prstGeom prst="cube">
+              <a:avLst/>
+            </a:prstGeom>
+            <a:solidFill>
+              <a:schemeClr val="bg1"/>
+            </a:solidFill>
+            <a:ln w="19050">
+              <a:solidFill>
+                <a:srgbClr val="D71F3A"/>
+              </a:solidFill>
+            </a:ln>
+          </p:spPr>
+          <p:style>
+            <a:lnRef idx="2">
+              <a:schemeClr val="accent1">
+                <a:shade val="50000"/>
+              </a:schemeClr>
+            </a:lnRef>
+            <a:fillRef idx="1">
+              <a:schemeClr val="accent1"/>
+            </a:fillRef>
+            <a:effectRef idx="0">
+              <a:schemeClr val="accent1"/>
+            </a:effectRef>
+            <a:fontRef idx="minor">
+              <a:schemeClr val="lt1"/>
+            </a:fontRef>
+          </p:style>
+          <p:txBody>
+            <a:bodyPr rtlCol="0" anchor="ctr"/>
+            <a:lstStyle/>
+            <a:p>
+              <a:pPr algn="ctr"/>
+              <a:endParaRPr lang="nl-NL"/>
+            </a:p>
+          </p:txBody>
+        </p:sp>
         <p:sp>
           <p:nvSpPr>
             <p:cNvPr id="5" name="Rectangle 4"/>
@@ -3056,9 +3184,9 @@
             <p:nvPr/>
           </p:nvSpPr>
           <p:spPr>
-            <a:xfrm rot="281093">
-              <a:off x="4347106" y="2859501"/>
-              <a:ext cx="810315" cy="915108"/>
+            <a:xfrm rot="285517">
+              <a:off x="4621097" y="5269199"/>
+              <a:ext cx="508000" cy="591834"/>
             </a:xfrm>
             <a:prstGeom prst="rect">
               <a:avLst/>
@@ -3112,8 +3240,8 @@
           </p:nvSpPr>
           <p:spPr>
             <a:xfrm rot="433088">
-              <a:off x="3685454" y="3014219"/>
-              <a:ext cx="785818" cy="785818"/>
+              <a:off x="4198026" y="5366098"/>
+              <a:ext cx="492643" cy="483103"/>
             </a:xfrm>
             <a:prstGeom prst="rect">
               <a:avLst/>
@@ -3160,9 +3288,9 @@
             <p:nvPr/>
           </p:nvSpPr>
           <p:spPr>
-            <a:xfrm rot="21315779">
-              <a:off x="3894522" y="2415978"/>
-              <a:ext cx="769032" cy="752093"/>
+            <a:xfrm>
+              <a:off x="4329094" y="4998313"/>
+              <a:ext cx="482119" cy="462370"/>
             </a:xfrm>
             <a:prstGeom prst="rect">
               <a:avLst/>
@@ -3206,53 +3334,341 @@
             </a:p>
           </p:txBody>
         </p:sp>
-        <p:sp>
-          <p:nvSpPr>
-            <p:cNvPr id="7" name="Cube 6"/>
-            <p:cNvSpPr/>
-            <p:nvPr/>
-          </p:nvSpPr>
-          <p:spPr>
-            <a:xfrm rot="382530">
-              <a:off x="3622090" y="2627790"/>
-              <a:ext cx="1287262" cy="1287263"/>
-            </a:xfrm>
-            <a:prstGeom prst="cube">
-              <a:avLst/>
-            </a:prstGeom>
-            <a:solidFill>
-              <a:srgbClr val="00B0F0">
-                <a:alpha val="46000"/>
-              </a:srgbClr>
-            </a:solidFill>
-            <a:ln w="3175"/>
-          </p:spPr>
-          <p:style>
-            <a:lnRef idx="2">
-              <a:schemeClr val="accent1">
-                <a:shade val="50000"/>
-              </a:schemeClr>
-            </a:lnRef>
-            <a:fillRef idx="1">
-              <a:schemeClr val="accent1"/>
-            </a:fillRef>
-            <a:effectRef idx="0">
-              <a:schemeClr val="accent1"/>
-            </a:effectRef>
-            <a:fontRef idx="minor">
-              <a:schemeClr val="lt1"/>
-            </a:fontRef>
-          </p:style>
-          <p:txBody>
-            <a:bodyPr rtlCol="0" anchor="ctr"/>
-            <a:lstStyle/>
-            <a:p>
-              <a:pPr algn="ctr"/>
-              <a:endParaRPr lang="nl-NL"/>
-            </a:p>
-          </p:txBody>
-        </p:sp>
       </p:grpSp>
+      <p:sp>
+        <p:nvSpPr>
+          <p:cNvPr id="15" name="Rectangle 14"/>
+          <p:cNvSpPr/>
+          <p:nvPr/>
+        </p:nvSpPr>
+        <p:spPr>
+          <a:xfrm>
+            <a:off x="1606858" y="2228295"/>
+            <a:ext cx="3675355" cy="177554"/>
+          </a:xfrm>
+          <a:prstGeom prst="rect">
+            <a:avLst/>
+          </a:prstGeom>
+          <a:solidFill>
+            <a:srgbClr val="D71F3A"/>
+          </a:solidFill>
+          <a:ln>
+            <a:noFill/>
+          </a:ln>
+        </p:spPr>
+        <p:style>
+          <a:lnRef idx="2">
+            <a:schemeClr val="accent1">
+              <a:shade val="50000"/>
+            </a:schemeClr>
+          </a:lnRef>
+          <a:fillRef idx="1">
+            <a:schemeClr val="accent1"/>
+          </a:fillRef>
+          <a:effectRef idx="0">
+            <a:schemeClr val="accent1"/>
+          </a:effectRef>
+          <a:fontRef idx="minor">
+            <a:schemeClr val="lt1"/>
+          </a:fontRef>
+        </p:style>
+        <p:txBody>
+          <a:bodyPr rtlCol="0" anchor="ctr"/>
+          <a:lstStyle/>
+          <a:p>
+            <a:r>
+              <a:rPr lang="nl-NL" sz="1200" dirty="0" err="1" smtClean="0">
+                <a:latin typeface="Verdana" pitchFamily="34" charset="0"/>
+                <a:ea typeface="Verdana" pitchFamily="34" charset="0"/>
+                <a:cs typeface="Verdana" pitchFamily="34" charset="0"/>
+              </a:rPr>
+              <a:t>TweetBox</a:t>
+            </a:r>
+            <a:endParaRPr lang="nl-NL" sz="1200" dirty="0">
+              <a:latin typeface="Verdana" pitchFamily="34" charset="0"/>
+              <a:ea typeface="Verdana" pitchFamily="34" charset="0"/>
+              <a:cs typeface="Verdana" pitchFamily="34" charset="0"/>
+            </a:endParaRPr>
+          </a:p>
+        </p:txBody>
+      </p:sp>
+      <p:sp>
+        <p:nvSpPr>
+          <p:cNvPr id="16" name="TextBox 15"/>
+          <p:cNvSpPr txBox="1"/>
+          <p:nvPr/>
+        </p:nvSpPr>
+        <p:spPr>
+          <a:xfrm>
+            <a:off x="1642370" y="2512380"/>
+            <a:ext cx="2849731" cy="1323439"/>
+          </a:xfrm>
+          <a:prstGeom prst="rect">
+            <a:avLst/>
+          </a:prstGeom>
+          <a:noFill/>
+          <a:ln>
+            <a:noFill/>
+          </a:ln>
+        </p:spPr>
+        <p:txBody>
+          <a:bodyPr wrap="square" rtlCol="0">
+            <a:spAutoFit/>
+          </a:bodyPr>
+          <a:lstStyle/>
+          <a:p>
+            <a:r>
+              <a:rPr lang="nl-NL" sz="1000" dirty="0" smtClean="0">
+                <a:solidFill>
+                  <a:schemeClr val="bg1"/>
+                </a:solidFill>
+                <a:latin typeface="Verdana" pitchFamily="34" charset="0"/>
+                <a:ea typeface="Verdana" pitchFamily="34" charset="0"/>
+                <a:cs typeface="Verdana" pitchFamily="34" charset="0"/>
+              </a:rPr>
+              <a:t>A </a:t>
+            </a:r>
+            <a:r>
+              <a:rPr lang="nl-NL" sz="1000" dirty="0" err="1" smtClean="0">
+                <a:solidFill>
+                  <a:schemeClr val="bg1"/>
+                </a:solidFill>
+                <a:latin typeface="Verdana" pitchFamily="34" charset="0"/>
+                <a:ea typeface="Verdana" pitchFamily="34" charset="0"/>
+                <a:cs typeface="Verdana" pitchFamily="34" charset="0"/>
+              </a:rPr>
+              <a:t>T</a:t>
+            </a:r>
+            <a:r>
+              <a:rPr lang="nl-NL" sz="1000" dirty="0" err="1" smtClean="0">
+                <a:solidFill>
+                  <a:schemeClr val="bg1"/>
+                </a:solidFill>
+                <a:latin typeface="Verdana" pitchFamily="34" charset="0"/>
+                <a:ea typeface="Verdana" pitchFamily="34" charset="0"/>
+                <a:cs typeface="Verdana" pitchFamily="34" charset="0"/>
+              </a:rPr>
+              <a:t>witter</a:t>
+            </a:r>
+            <a:r>
+              <a:rPr lang="nl-NL" sz="1000" dirty="0" smtClean="0">
+                <a:solidFill>
+                  <a:schemeClr val="bg1"/>
+                </a:solidFill>
+                <a:latin typeface="Verdana" pitchFamily="34" charset="0"/>
+                <a:ea typeface="Verdana" pitchFamily="34" charset="0"/>
+                <a:cs typeface="Verdana" pitchFamily="34" charset="0"/>
+              </a:rPr>
+              <a:t> desktop </a:t>
+            </a:r>
+            <a:r>
+              <a:rPr lang="nl-NL" sz="1000" dirty="0" err="1" smtClean="0">
+                <a:solidFill>
+                  <a:schemeClr val="bg1"/>
+                </a:solidFill>
+                <a:latin typeface="Verdana" pitchFamily="34" charset="0"/>
+                <a:ea typeface="Verdana" pitchFamily="34" charset="0"/>
+                <a:cs typeface="Verdana" pitchFamily="34" charset="0"/>
+              </a:rPr>
+              <a:t>client</a:t>
+            </a:r>
+            <a:r>
+              <a:rPr lang="nl-NL" sz="1000" dirty="0" smtClean="0">
+                <a:solidFill>
+                  <a:schemeClr val="bg1"/>
+                </a:solidFill>
+                <a:latin typeface="Verdana" pitchFamily="34" charset="0"/>
+                <a:ea typeface="Verdana" pitchFamily="34" charset="0"/>
+                <a:cs typeface="Verdana" pitchFamily="34" charset="0"/>
+              </a:rPr>
+              <a:t> built </a:t>
+            </a:r>
+            <a:r>
+              <a:rPr lang="nl-NL" sz="1000" dirty="0" err="1" smtClean="0">
+                <a:solidFill>
+                  <a:schemeClr val="bg1"/>
+                </a:solidFill>
+                <a:latin typeface="Verdana" pitchFamily="34" charset="0"/>
+                <a:ea typeface="Verdana" pitchFamily="34" charset="0"/>
+                <a:cs typeface="Verdana" pitchFamily="34" charset="0"/>
+              </a:rPr>
+              <a:t>with</a:t>
+            </a:r>
+            <a:r>
+              <a:rPr lang="nl-NL" sz="1000" dirty="0" smtClean="0">
+                <a:solidFill>
+                  <a:schemeClr val="bg1"/>
+                </a:solidFill>
+                <a:latin typeface="Verdana" pitchFamily="34" charset="0"/>
+                <a:ea typeface="Verdana" pitchFamily="34" charset="0"/>
+                <a:cs typeface="Verdana" pitchFamily="34" charset="0"/>
+              </a:rPr>
+              <a:t> </a:t>
+            </a:r>
+            <a:r>
+              <a:rPr lang="nl-NL" sz="1000" dirty="0" err="1" smtClean="0">
+                <a:solidFill>
+                  <a:schemeClr val="bg1"/>
+                </a:solidFill>
+                <a:latin typeface="Verdana" pitchFamily="34" charset="0"/>
+                <a:ea typeface="Verdana" pitchFamily="34" charset="0"/>
+                <a:cs typeface="Verdana" pitchFamily="34" charset="0"/>
+              </a:rPr>
+              <a:t>JavaFX</a:t>
+            </a:r>
+            <a:endParaRPr lang="nl-NL" sz="1000" dirty="0" smtClean="0">
+              <a:solidFill>
+                <a:schemeClr val="bg1"/>
+              </a:solidFill>
+              <a:latin typeface="Verdana" pitchFamily="34" charset="0"/>
+              <a:ea typeface="Verdana" pitchFamily="34" charset="0"/>
+              <a:cs typeface="Verdana" pitchFamily="34" charset="0"/>
+            </a:endParaRPr>
+          </a:p>
+          <a:p>
+            <a:endParaRPr lang="nl-NL" sz="1000" dirty="0" smtClean="0">
+              <a:solidFill>
+                <a:schemeClr val="bg1"/>
+              </a:solidFill>
+              <a:latin typeface="Verdana" pitchFamily="34" charset="0"/>
+              <a:ea typeface="Verdana" pitchFamily="34" charset="0"/>
+              <a:cs typeface="Verdana" pitchFamily="34" charset="0"/>
+            </a:endParaRPr>
+          </a:p>
+          <a:p>
+            <a:endParaRPr lang="nl-NL" sz="1000" dirty="0" smtClean="0">
+              <a:solidFill>
+                <a:schemeClr val="bg1"/>
+              </a:solidFill>
+              <a:latin typeface="Verdana" pitchFamily="34" charset="0"/>
+              <a:ea typeface="Verdana" pitchFamily="34" charset="0"/>
+              <a:cs typeface="Verdana" pitchFamily="34" charset="0"/>
+            </a:endParaRPr>
+          </a:p>
+          <a:p>
+            <a:endParaRPr lang="nl-NL" sz="1000" dirty="0" smtClean="0">
+              <a:solidFill>
+                <a:schemeClr val="bg1"/>
+              </a:solidFill>
+              <a:latin typeface="Verdana" pitchFamily="34" charset="0"/>
+              <a:ea typeface="Verdana" pitchFamily="34" charset="0"/>
+              <a:cs typeface="Verdana" pitchFamily="34" charset="0"/>
+            </a:endParaRPr>
+          </a:p>
+          <a:p>
+            <a:r>
+              <a:rPr lang="nl-NL" sz="1000" dirty="0" err="1" smtClean="0">
+                <a:solidFill>
+                  <a:schemeClr val="bg1"/>
+                </a:solidFill>
+                <a:latin typeface="Verdana" pitchFamily="34" charset="0"/>
+                <a:ea typeface="Verdana" pitchFamily="34" charset="0"/>
+                <a:cs typeface="Verdana" pitchFamily="34" charset="0"/>
+              </a:rPr>
+              <a:t>By</a:t>
+            </a:r>
+            <a:r>
+              <a:rPr lang="nl-NL" sz="1000" dirty="0" smtClean="0">
+                <a:solidFill>
+                  <a:schemeClr val="bg1"/>
+                </a:solidFill>
+                <a:latin typeface="Verdana" pitchFamily="34" charset="0"/>
+                <a:ea typeface="Verdana" pitchFamily="34" charset="0"/>
+                <a:cs typeface="Verdana" pitchFamily="34" charset="0"/>
+              </a:rPr>
+              <a:t>: Mark Nankman</a:t>
+            </a:r>
+          </a:p>
+          <a:p>
+            <a:endParaRPr lang="nl-NL" sz="1000" dirty="0" smtClean="0">
+              <a:solidFill>
+                <a:schemeClr val="bg1"/>
+              </a:solidFill>
+              <a:latin typeface="Verdana" pitchFamily="34" charset="0"/>
+              <a:ea typeface="Verdana" pitchFamily="34" charset="0"/>
+              <a:cs typeface="Verdana" pitchFamily="34" charset="0"/>
+            </a:endParaRPr>
+          </a:p>
+          <a:p>
+            <a:r>
+              <a:rPr lang="nl-NL" sz="1000" dirty="0" err="1" smtClean="0">
+                <a:solidFill>
+                  <a:schemeClr val="bg1"/>
+                </a:solidFill>
+                <a:latin typeface="Verdana" pitchFamily="34" charset="0"/>
+                <a:ea typeface="Verdana" pitchFamily="34" charset="0"/>
+                <a:cs typeface="Verdana" pitchFamily="34" charset="0"/>
+              </a:rPr>
+              <a:t>Licenced</a:t>
+            </a:r>
+            <a:r>
+              <a:rPr lang="nl-NL" sz="1000" dirty="0" smtClean="0">
+                <a:solidFill>
+                  <a:schemeClr val="bg1"/>
+                </a:solidFill>
+                <a:latin typeface="Verdana" pitchFamily="34" charset="0"/>
+                <a:ea typeface="Verdana" pitchFamily="34" charset="0"/>
+                <a:cs typeface="Verdana" pitchFamily="34" charset="0"/>
+              </a:rPr>
+              <a:t> </a:t>
+            </a:r>
+            <a:r>
+              <a:rPr lang="nl-NL" sz="1000" dirty="0" err="1" smtClean="0">
+                <a:solidFill>
+                  <a:schemeClr val="bg1"/>
+                </a:solidFill>
+                <a:latin typeface="Verdana" pitchFamily="34" charset="0"/>
+                <a:ea typeface="Verdana" pitchFamily="34" charset="0"/>
+                <a:cs typeface="Verdana" pitchFamily="34" charset="0"/>
+              </a:rPr>
+              <a:t>under</a:t>
+            </a:r>
+            <a:r>
+              <a:rPr lang="nl-NL" sz="1000" dirty="0" smtClean="0">
+                <a:solidFill>
+                  <a:schemeClr val="bg1"/>
+                </a:solidFill>
+                <a:latin typeface="Verdana" pitchFamily="34" charset="0"/>
+                <a:ea typeface="Verdana" pitchFamily="34" charset="0"/>
+                <a:cs typeface="Verdana" pitchFamily="34" charset="0"/>
+              </a:rPr>
+              <a:t> MPL 1.1</a:t>
+            </a:r>
+          </a:p>
+          <a:p>
+            <a:r>
+              <a:rPr lang="nl-NL" sz="1000" dirty="0" smtClean="0">
+                <a:solidFill>
+                  <a:schemeClr val="bg1"/>
+                </a:solidFill>
+                <a:latin typeface="Verdana" pitchFamily="34" charset="0"/>
+                <a:ea typeface="Verdana" pitchFamily="34" charset="0"/>
+                <a:cs typeface="Verdana" pitchFamily="34" charset="0"/>
+              </a:rPr>
+              <a:t>http</a:t>
+            </a:r>
+            <a:r>
+              <a:rPr lang="nl-NL" sz="1000" dirty="0" smtClean="0">
+                <a:solidFill>
+                  <a:schemeClr val="bg1"/>
+                </a:solidFill>
+                <a:latin typeface="Verdana" pitchFamily="34" charset="0"/>
+                <a:ea typeface="Verdana" pitchFamily="34" charset="0"/>
+                <a:cs typeface="Verdana" pitchFamily="34" charset="0"/>
+              </a:rPr>
+              <a:t>://code.google.com/p/tweetbox</a:t>
+            </a:r>
+            <a:endParaRPr lang="nl-NL" sz="1000" dirty="0" smtClean="0">
+              <a:solidFill>
+                <a:schemeClr val="bg1"/>
+              </a:solidFill>
+              <a:latin typeface="Verdana" pitchFamily="34" charset="0"/>
+              <a:ea typeface="Verdana" pitchFamily="34" charset="0"/>
+              <a:cs typeface="Verdana" pitchFamily="34" charset="0"/>
+            </a:endParaRPr>
+          </a:p>
+        </p:txBody>
+      </p:sp>
     </p:spTree>
   </p:cSld>
   <p:clrMapOvr>

</xml_diff>